<commit_message>
Korrektur von Animationen in der Präsentation
</commit_message>
<xml_diff>
--- a/Dart.pptx
+++ b/Dart.pptx
@@ -530,7 +530,7 @@
                   <a:schemeClr val="tx2"/>
                 </a:solidFill>
               </a:rPr>
-              <a:t>09.03.2022</a:t>
+              <a:t>30.03.2022</a:t>
             </a:fld>
             <a:endParaRPr lang="de-DE">
               <a:solidFill>
@@ -880,7 +880,7 @@
             <a:fld id="{B4113CCE-1A1A-46DB-884A-AE560F65C3AF}" type="datetimeFigureOut">
               <a:rPr lang="de-DE" smtClean="0"/>
               <a:pPr/>
-              <a:t>09.03.2022</a:t>
+              <a:t>30.03.2022</a:t>
             </a:fld>
             <a:endParaRPr lang="de-DE"/>
           </a:p>
@@ -9307,7 +9307,7 @@
           <a:p>
             <a:fld id="{4E6DF7AA-8899-480A-AE8B-97B651237939}" type="datetime1">
               <a:rPr lang="de-DE" smtClean="0"/>
-              <a:t>09.03.2022</a:t>
+              <a:t>30.03.2022</a:t>
             </a:fld>
             <a:endParaRPr lang="de-DE"/>
           </a:p>
@@ -9512,7 +9512,7 @@
           <a:p>
             <a:fld id="{A1082C62-1968-4D03-BE49-CB116A4D6814}" type="datetime1">
               <a:rPr lang="de-DE" smtClean="0"/>
-              <a:t>09.03.2022</a:t>
+              <a:t>30.03.2022</a:t>
             </a:fld>
             <a:endParaRPr lang="de-DE"/>
           </a:p>
@@ -9666,7 +9666,7 @@
           <a:p>
             <a:fld id="{C0E04462-FF80-4281-98D0-2AB88E65DA84}" type="datetime1">
               <a:rPr lang="de-DE" smtClean="0"/>
-              <a:t>09.03.2022</a:t>
+              <a:t>30.03.2022</a:t>
             </a:fld>
             <a:endParaRPr lang="de-DE"/>
           </a:p>
@@ -9903,7 +9903,7 @@
           <a:p>
             <a:fld id="{1FAA5A7F-2A4E-40D6-9FFE-960B13817A2C}" type="datetime1">
               <a:rPr lang="de-DE" smtClean="0"/>
-              <a:t>09.03.2022</a:t>
+              <a:t>30.03.2022</a:t>
             </a:fld>
             <a:endParaRPr lang="de-DE"/>
           </a:p>
@@ -10079,7 +10079,7 @@
           <a:p>
             <a:fld id="{382DDC3E-10C9-4B92-B2FB-A8167FB6AB1D}" type="datetime1">
               <a:rPr lang="de-DE" smtClean="0"/>
-              <a:t>09.03.2022</a:t>
+              <a:t>30.03.2022</a:t>
             </a:fld>
             <a:endParaRPr lang="de-DE"/>
           </a:p>
@@ -10255,7 +10255,7 @@
           <a:p>
             <a:fld id="{8159FE7A-07D2-4D3F-9855-29B7F3DF1D43}" type="datetime1">
               <a:rPr lang="de-DE" smtClean="0"/>
-              <a:t>09.03.2022</a:t>
+              <a:t>30.03.2022</a:t>
             </a:fld>
             <a:endParaRPr lang="de-DE"/>
           </a:p>
@@ -10405,7 +10405,7 @@
           <a:p>
             <a:fld id="{7CF1A54B-9CB9-49D3-BA48-5A7ECDBA0943}" type="datetime1">
               <a:rPr lang="de-DE" smtClean="0"/>
-              <a:t>09.03.2022</a:t>
+              <a:t>30.03.2022</a:t>
             </a:fld>
             <a:endParaRPr lang="de-DE"/>
           </a:p>
@@ -10503,7 +10503,7 @@
           <a:p>
             <a:fld id="{5621DBFA-780B-465A-97B9-CC4792E01430}" type="datetime1">
               <a:rPr lang="de-DE" smtClean="0"/>
-              <a:t>09.03.2022</a:t>
+              <a:t>30.03.2022</a:t>
             </a:fld>
             <a:endParaRPr lang="de-DE"/>
           </a:p>
@@ -10627,7 +10627,7 @@
           <a:p>
             <a:fld id="{13ADA68E-BD65-4999-8C0B-CC0F110C2BD3}" type="datetime1">
               <a:rPr lang="de-DE" smtClean="0"/>
-              <a:t>09.03.2022</a:t>
+              <a:t>30.03.2022</a:t>
             </a:fld>
             <a:endParaRPr lang="de-DE"/>
           </a:p>
@@ -10811,7 +10811,7 @@
           <a:p>
             <a:fld id="{93B55C80-8AAA-4242-8442-4A53184707C3}" type="datetime1">
               <a:rPr lang="de-DE" smtClean="0"/>
-              <a:t>09.03.2022</a:t>
+              <a:t>30.03.2022</a:t>
             </a:fld>
             <a:endParaRPr lang="de-DE"/>
           </a:p>
@@ -11016,7 +11016,7 @@
           <a:p>
             <a:fld id="{4485BB24-7FA9-422A-BF70-F9FA49C1D9F8}" type="datetime1">
               <a:rPr lang="de-DE" smtClean="0"/>
-              <a:t>09.03.2022</a:t>
+              <a:t>30.03.2022</a:t>
             </a:fld>
             <a:endParaRPr lang="de-DE"/>
           </a:p>
@@ -11374,7 +11374,7 @@
           <a:p>
             <a:fld id="{3CD93E9C-CF59-4162-A977-F7642EDBB23A}" type="datetime1">
               <a:rPr lang="de-DE" smtClean="0"/>
-              <a:t>09.03.2022</a:t>
+              <a:t>30.03.2022</a:t>
             </a:fld>
             <a:endParaRPr lang="de-DE" dirty="0"/>
           </a:p>
@@ -12015,7 +12015,7 @@
           <a:p>
             <a:fld id="{6FE8A2CE-6D32-4716-A090-EDD7EE0B4140}" type="datetime1">
               <a:rPr lang="de-DE" smtClean="0"/>
-              <a:t>09.03.2022</a:t>
+              <a:t>30.03.2022</a:t>
             </a:fld>
             <a:endParaRPr lang="de-DE" dirty="0"/>
           </a:p>
@@ -12687,7 +12687,7 @@
           <a:p>
             <a:fld id="{603113A9-B1ED-4EC0-A094-9858FCF2D0C8}" type="datetime1">
               <a:rPr lang="de-DE" smtClean="0"/>
-              <a:t>09.03.2022</a:t>
+              <a:t>30.03.2022</a:t>
             </a:fld>
             <a:endParaRPr lang="de-DE"/>
           </a:p>
@@ -12849,7 +12849,7 @@
           <a:p>
             <a:fld id="{D4664C08-255D-43EF-A97B-FABF96999946}" type="datetime1">
               <a:rPr lang="de-DE" smtClean="0"/>
-              <a:t>09.03.2022</a:t>
+              <a:t>30.03.2022</a:t>
             </a:fld>
             <a:endParaRPr lang="de-DE"/>
           </a:p>
@@ -13156,7 +13156,7 @@
           <a:p>
             <a:fld id="{3F431DAA-9B38-40B6-A989-743F7941179E}" type="datetime1">
               <a:rPr lang="de-DE" smtClean="0"/>
-              <a:t>09.03.2022</a:t>
+              <a:t>30.03.2022</a:t>
             </a:fld>
             <a:endParaRPr lang="de-DE"/>
           </a:p>
@@ -13328,7 +13328,7 @@
           <a:p>
             <a:fld id="{90FC750D-92E1-43D8-A4A2-8761C4AC9C9C}" type="datetime1">
               <a:rPr lang="de-DE" smtClean="0"/>
-              <a:t>09.03.2022</a:t>
+              <a:t>30.03.2022</a:t>
             </a:fld>
             <a:endParaRPr lang="de-DE"/>
           </a:p>
@@ -13559,7 +13559,7 @@
           <a:p>
             <a:fld id="{67B86D56-690E-44D4-B025-B41069787D15}" type="datetime1">
               <a:rPr lang="de-DE" smtClean="0"/>
-              <a:t>09.03.2022</a:t>
+              <a:t>30.03.2022</a:t>
             </a:fld>
             <a:endParaRPr lang="de-DE"/>
           </a:p>
@@ -13813,7 +13813,7 @@
           <a:p>
             <a:fld id="{252C698B-F0B1-44D7-8F7D-9D6299D534F0}" type="datetime1">
               <a:rPr lang="de-DE" smtClean="0"/>
-              <a:t>09.03.2022</a:t>
+              <a:t>30.03.2022</a:t>
             </a:fld>
             <a:endParaRPr lang="de-DE"/>
           </a:p>
@@ -14316,7 +14316,7 @@
           <a:p>
             <a:fld id="{A952138C-0142-4C6B-A620-863AA96BBBE1}" type="datetime1">
               <a:rPr lang="de-DE" smtClean="0"/>
-              <a:t>09.03.2022</a:t>
+              <a:t>30.03.2022</a:t>
             </a:fld>
             <a:endParaRPr lang="de-DE"/>
           </a:p>
@@ -14552,7 +14552,7 @@
           <a:p>
             <a:fld id="{7127E464-1A99-4532-A297-E1D7378D9E61}" type="datetime1">
               <a:rPr lang="de-DE" smtClean="0"/>
-              <a:t>09.03.2022</a:t>
+              <a:t>30.03.2022</a:t>
             </a:fld>
             <a:endParaRPr lang="de-DE"/>
           </a:p>
@@ -14933,7 +14933,7 @@
           <a:p>
             <a:fld id="{77B5C711-A7A8-40A0-AEA6-3F77D4628817}" type="datetime1">
               <a:rPr lang="de-DE" smtClean="0"/>
-              <a:t>09.03.2022</a:t>
+              <a:t>30.03.2022</a:t>
             </a:fld>
             <a:endParaRPr lang="de-DE"/>
           </a:p>
@@ -15312,7 +15312,7 @@
           <a:p>
             <a:fld id="{27A2010A-1149-4F23-80A2-1B4570F18F3A}" type="datetime1">
               <a:rPr lang="de-DE" smtClean="0"/>
-              <a:t>09.03.2022</a:t>
+              <a:t>30.03.2022</a:t>
             </a:fld>
             <a:endParaRPr lang="de-DE"/>
           </a:p>
@@ -15569,7 +15569,7 @@
           <a:p>
             <a:fld id="{B70EBCA3-FB0B-48D9-A2E5-56DBD5624AFE}" type="datetime1">
               <a:rPr lang="de-DE" smtClean="0"/>
-              <a:t>09.03.2022</a:t>
+              <a:t>30.03.2022</a:t>
             </a:fld>
             <a:endParaRPr lang="de-DE"/>
           </a:p>
@@ -15883,7 +15883,7 @@
           <a:p>
             <a:fld id="{AAEBEB04-CBF0-4835-872C-2565D4E2EBF1}" type="datetime1">
               <a:rPr lang="de-DE" smtClean="0"/>
-              <a:t>09.03.2022</a:t>
+              <a:t>30.03.2022</a:t>
             </a:fld>
             <a:endParaRPr lang="de-DE"/>
           </a:p>
@@ -16186,7 +16186,7 @@
           <a:p>
             <a:fld id="{92A047F3-1820-4570-AC17-C8DA167C5F14}" type="datetime1">
               <a:rPr lang="de-DE" smtClean="0"/>
-              <a:t>09.03.2022</a:t>
+              <a:t>30.03.2022</a:t>
             </a:fld>
             <a:endParaRPr lang="de-DE"/>
           </a:p>
@@ -16655,7 +16655,7 @@
           <a:p>
             <a:fld id="{8F663D0B-A90A-4472-ADF1-2D4D5E0E002A}" type="datetime1">
               <a:rPr lang="de-DE" smtClean="0"/>
-              <a:t>09.03.2022</a:t>
+              <a:t>30.03.2022</a:t>
             </a:fld>
             <a:endParaRPr lang="de-DE"/>
           </a:p>
@@ -16845,7 +16845,7 @@
           <a:p>
             <a:fld id="{59577B53-2C7E-4EC5-B9C8-6C04D3456AA1}" type="datetime1">
               <a:rPr lang="de-DE" smtClean="0"/>
-              <a:t>09.03.2022</a:t>
+              <a:t>30.03.2022</a:t>
             </a:fld>
             <a:endParaRPr lang="de-DE"/>
           </a:p>
@@ -17407,7 +17407,7 @@
           <a:p>
             <a:fld id="{C3460205-A5AE-420E-9AB9-04AA7C4205FA}" type="datetime1">
               <a:rPr lang="de-DE" smtClean="0"/>
-              <a:t>09.03.2022</a:t>
+              <a:t>30.03.2022</a:t>
             </a:fld>
             <a:endParaRPr lang="de-DE"/>
           </a:p>
@@ -17904,7 +17904,7 @@
           <a:p>
             <a:fld id="{C81998FD-B568-4E47-AA9F-CE36B3FEB5BA}" type="datetime1">
               <a:rPr lang="de-DE" smtClean="0"/>
-              <a:t>09.03.2022</a:t>
+              <a:t>30.03.2022</a:t>
             </a:fld>
             <a:endParaRPr lang="de-DE"/>
           </a:p>
@@ -18260,7 +18260,7 @@
           <a:p>
             <a:fld id="{0A4F56F1-7827-4042-A276-DAF40AC0B000}" type="datetime1">
               <a:rPr lang="de-DE" smtClean="0"/>
-              <a:t>09.03.2022</a:t>
+              <a:t>30.03.2022</a:t>
             </a:fld>
             <a:endParaRPr lang="de-DE"/>
           </a:p>
@@ -18558,7 +18558,7 @@
           <a:p>
             <a:fld id="{DAB02174-66FA-41E9-A997-DF7D3619438B}" type="datetime1">
               <a:rPr lang="de-DE" smtClean="0"/>
-              <a:t>09.03.2022</a:t>
+              <a:t>30.03.2022</a:t>
             </a:fld>
             <a:endParaRPr lang="de-DE"/>
           </a:p>
@@ -18939,7 +18939,7 @@
           <a:p>
             <a:fld id="{BDFFDF87-2C7B-4FBB-B7F3-0EB8FC88FA6F}" type="datetime1">
               <a:rPr lang="de-DE" smtClean="0"/>
-              <a:t>09.03.2022</a:t>
+              <a:t>30.03.2022</a:t>
             </a:fld>
             <a:endParaRPr lang="de-DE"/>
           </a:p>
@@ -19272,7 +19272,7 @@
           <a:p>
             <a:fld id="{4AEAFF43-79D1-488F-88E5-AECF0C52E4F6}" type="datetime1">
               <a:rPr lang="de-DE" smtClean="0"/>
-              <a:t>09.03.2022</a:t>
+              <a:t>30.03.2022</a:t>
             </a:fld>
             <a:endParaRPr lang="de-DE"/>
           </a:p>
@@ -19550,7 +19550,7 @@
           <a:p>
             <a:fld id="{F3624D99-4580-4939-A184-6854C4D65CB3}" type="datetime1">
               <a:rPr lang="de-DE" smtClean="0"/>
-              <a:t>09.03.2022</a:t>
+              <a:t>30.03.2022</a:t>
             </a:fld>
             <a:endParaRPr lang="de-DE"/>
           </a:p>
@@ -19746,7 +19746,7 @@
           <a:p>
             <a:fld id="{642CBE49-AABD-4678-8D76-A8610D6E4D30}" type="datetime1">
               <a:rPr lang="de-DE" smtClean="0"/>
-              <a:t>09.03.2022</a:t>
+              <a:t>30.03.2022</a:t>
             </a:fld>
             <a:endParaRPr lang="de-DE"/>
           </a:p>
@@ -20013,7 +20013,7 @@
           <a:p>
             <a:fld id="{2E581C20-4FEA-4BDB-99ED-7F7C03D2ECE0}" type="datetime1">
               <a:rPr lang="de-DE" smtClean="0"/>
-              <a:t>09.03.2022</a:t>
+              <a:t>30.03.2022</a:t>
             </a:fld>
             <a:endParaRPr lang="de-DE"/>
           </a:p>
@@ -20447,7 +20447,7 @@
           <a:p>
             <a:fld id="{9C5032AF-412C-4954-8799-22E9C987B64F}" type="datetime1">
               <a:rPr lang="de-DE" smtClean="0"/>
-              <a:t>09.03.2022</a:t>
+              <a:t>30.03.2022</a:t>
             </a:fld>
             <a:endParaRPr lang="de-DE"/>
           </a:p>
@@ -21025,7 +21025,7 @@
           <a:p>
             <a:fld id="{F2FEDD9D-5594-473A-899D-C0AD9514F726}" type="datetime1">
               <a:rPr lang="de-DE" smtClean="0"/>
-              <a:t>09.03.2022</a:t>
+              <a:t>30.03.2022</a:t>
             </a:fld>
             <a:endParaRPr lang="de-DE"/>
           </a:p>
@@ -21287,7 +21287,7 @@
           <a:p>
             <a:fld id="{95C3B550-B314-4EBE-B643-25AC9427FA8B}" type="datetime1">
               <a:rPr lang="de-DE" smtClean="0"/>
-              <a:t>09.03.2022</a:t>
+              <a:t>30.03.2022</a:t>
             </a:fld>
             <a:endParaRPr lang="de-DE"/>
           </a:p>
@@ -21633,7 +21633,7 @@
           <a:p>
             <a:fld id="{767B626B-00B4-4CEC-8206-7F4851B03FEF}" type="datetime1">
               <a:rPr lang="de-DE" smtClean="0"/>
-              <a:t>09.03.2022</a:t>
+              <a:t>30.03.2022</a:t>
             </a:fld>
             <a:endParaRPr lang="de-DE"/>
           </a:p>
@@ -21945,7 +21945,7 @@
           <a:p>
             <a:fld id="{102EEC64-5E38-4CDE-986C-4F454B58738A}" type="datetime1">
               <a:rPr lang="de-DE" smtClean="0"/>
-              <a:t>09.03.2022</a:t>
+              <a:t>30.03.2022</a:t>
             </a:fld>
             <a:endParaRPr lang="de-DE"/>
           </a:p>
@@ -22178,7 +22178,7 @@
           <a:p>
             <a:fld id="{8B9E1184-3E8E-4927-B70E-FCD133F545CF}" type="datetime1">
               <a:rPr lang="de-DE" smtClean="0"/>
-              <a:t>09.03.2022</a:t>
+              <a:t>30.03.2022</a:t>
             </a:fld>
             <a:endParaRPr lang="de-DE"/>
           </a:p>
@@ -22606,7 +22606,7 @@
           <a:p>
             <a:fld id="{372285A9-CAD1-4F8C-A320-59D4C92876C5}" type="datetime1">
               <a:rPr lang="de-DE" smtClean="0"/>
-              <a:t>09.03.2022</a:t>
+              <a:t>30.03.2022</a:t>
             </a:fld>
             <a:endParaRPr lang="de-DE"/>
           </a:p>
@@ -22819,7 +22819,7 @@
           <a:p>
             <a:fld id="{2F8DC1E6-2D30-4DE7-9C9D-5217FE18022E}" type="datetime1">
               <a:rPr lang="de-DE" smtClean="0"/>
-              <a:t>09.03.2022</a:t>
+              <a:t>30.03.2022</a:t>
             </a:fld>
             <a:endParaRPr lang="de-DE"/>
           </a:p>
@@ -22963,7 +22963,7 @@
           <a:p>
             <a:fld id="{893F816E-7DC2-4064-87AA-D097DF435DB9}" type="datetime1">
               <a:rPr lang="de-DE" smtClean="0"/>
-              <a:t>09.03.2022</a:t>
+              <a:t>30.03.2022</a:t>
             </a:fld>
             <a:endParaRPr lang="de-DE"/>
           </a:p>
@@ -23200,7 +23200,7 @@
           <a:p>
             <a:fld id="{637BE197-E414-48F3-B656-784E07538695}" type="datetime1">
               <a:rPr lang="de-DE" smtClean="0"/>
-              <a:t>09.03.2022</a:t>
+              <a:t>30.03.2022</a:t>
             </a:fld>
             <a:endParaRPr lang="de-DE"/>
           </a:p>
@@ -23496,7 +23496,7 @@
           <a:p>
             <a:fld id="{AC9925A1-4637-41D7-AEAC-8AA9FDFB7140}" type="datetime1">
               <a:rPr lang="de-DE" smtClean="0"/>
-              <a:t>09.03.2022</a:t>
+              <a:t>30.03.2022</a:t>
             </a:fld>
             <a:endParaRPr lang="de-DE"/>
           </a:p>
@@ -24079,7 +24079,7 @@
           <a:p>
             <a:fld id="{BC048919-3C08-48F6-A0CD-915EC777362A}" type="datetime1">
               <a:rPr lang="de-DE" smtClean="0"/>
-              <a:t>09.03.2022</a:t>
+              <a:t>30.03.2022</a:t>
             </a:fld>
             <a:endParaRPr lang="de-DE"/>
           </a:p>
@@ -24332,7 +24332,7 @@
           <a:p>
             <a:fld id="{94C91350-6869-4C72-8675-ECEAAAF05F8D}" type="datetime1">
               <a:rPr lang="de-DE" smtClean="0"/>
-              <a:t>09.03.2022</a:t>
+              <a:t>30.03.2022</a:t>
             </a:fld>
             <a:endParaRPr lang="de-DE"/>
           </a:p>
@@ -24674,7 +24674,7 @@
           <a:p>
             <a:fld id="{ACA1733B-6687-4EEA-9A6B-2EF228C82457}" type="datetime1">
               <a:rPr lang="de-DE" smtClean="0"/>
-              <a:t>09.03.2022</a:t>
+              <a:t>30.03.2022</a:t>
             </a:fld>
             <a:endParaRPr lang="de-DE"/>
           </a:p>
@@ -25007,7 +25007,7 @@
           <a:p>
             <a:fld id="{2BBD85E3-27A5-4125-9DB2-C537C85BBE8A}" type="datetime1">
               <a:rPr lang="de-DE" smtClean="0"/>
-              <a:t>09.03.2022</a:t>
+              <a:t>30.03.2022</a:t>
             </a:fld>
             <a:endParaRPr lang="de-DE"/>
           </a:p>
@@ -25182,7 +25182,7 @@
           <a:p>
             <a:fld id="{115AC75E-72B2-486D-BEF5-A13F9B218F2F}" type="datetime1">
               <a:rPr lang="de-DE" smtClean="0"/>
-              <a:t>09.03.2022</a:t>
+              <a:t>30.03.2022</a:t>
             </a:fld>
             <a:endParaRPr lang="de-DE"/>
           </a:p>
@@ -25572,7 +25572,7 @@
           <a:p>
             <a:fld id="{B8ECF4B1-F230-4767-9D40-08A350DFB7D7}" type="datetime1">
               <a:rPr lang="de-DE" smtClean="0"/>
-              <a:t>09.03.2022</a:t>
+              <a:t>30.03.2022</a:t>
             </a:fld>
             <a:endParaRPr lang="de-DE"/>
           </a:p>
@@ -25908,7 +25908,7 @@
           <a:p>
             <a:fld id="{DFEB386C-A89C-4E71-8C7A-EB57A1CCB74F}" type="datetime1">
               <a:rPr lang="de-DE" smtClean="0"/>
-              <a:t>09.03.2022</a:t>
+              <a:t>30.03.2022</a:t>
             </a:fld>
             <a:endParaRPr lang="de-DE"/>
           </a:p>
@@ -26253,7 +26253,7 @@
           <a:p>
             <a:fld id="{E3A6C6BD-3868-452A-A2BD-92328FD8B4E8}" type="datetime1">
               <a:rPr lang="de-DE" smtClean="0"/>
-              <a:t>09.03.2022</a:t>
+              <a:t>30.03.2022</a:t>
             </a:fld>
             <a:endParaRPr lang="de-DE"/>
           </a:p>
@@ -26472,7 +26472,7 @@
           <a:p>
             <a:fld id="{B60FD287-29C3-4567-A3C8-1214880B52D5}" type="datetime1">
               <a:rPr lang="de-DE" smtClean="0"/>
-              <a:t>09.03.2022</a:t>
+              <a:t>30.03.2022</a:t>
             </a:fld>
             <a:endParaRPr lang="de-DE"/>
           </a:p>
@@ -26867,7 +26867,7 @@
           <a:p>
             <a:fld id="{172E1AE1-643D-418C-ACE4-F2637FAE5286}" type="datetime1">
               <a:rPr lang="de-DE" smtClean="0"/>
-              <a:t>09.03.2022</a:t>
+              <a:t>30.03.2022</a:t>
             </a:fld>
             <a:endParaRPr lang="de-DE"/>
           </a:p>
@@ -27180,7 +27180,7 @@
           <a:p>
             <a:fld id="{C74E5831-6EC7-46CD-950B-539BB31CC002}" type="datetime1">
               <a:rPr lang="de-DE" smtClean="0"/>
-              <a:t>09.03.2022</a:t>
+              <a:t>30.03.2022</a:t>
             </a:fld>
             <a:endParaRPr lang="de-DE"/>
           </a:p>
@@ -27809,7 +27809,7 @@
           <a:p>
             <a:fld id="{0C2E1D0D-BBB0-4269-8DC7-C28B8DA8D26F}" type="datetime1">
               <a:rPr lang="de-DE" smtClean="0"/>
-              <a:t>09.03.2022</a:t>
+              <a:t>30.03.2022</a:t>
             </a:fld>
             <a:endParaRPr lang="de-DE"/>
           </a:p>
@@ -28117,7 +28117,7 @@
           <a:p>
             <a:fld id="{509B9FD4-6125-48DF-AAFB-8A90591F704C}" type="datetime1">
               <a:rPr lang="de-DE" smtClean="0"/>
-              <a:t>09.03.2022</a:t>
+              <a:t>30.03.2022</a:t>
             </a:fld>
             <a:endParaRPr lang="de-DE"/>
           </a:p>
@@ -28393,7 +28393,7 @@
           <a:p>
             <a:fld id="{5E005D36-C238-4437-9368-75EE1209248D}" type="datetime1">
               <a:rPr lang="de-DE" smtClean="0"/>
-              <a:t>09.03.2022</a:t>
+              <a:t>30.03.2022</a:t>
             </a:fld>
             <a:endParaRPr lang="de-DE"/>
           </a:p>
@@ -28573,7 +28573,7 @@
           <a:p>
             <a:fld id="{21A4D148-919D-4643-B21F-50F1B7EF8BA2}" type="datetime1">
               <a:rPr lang="de-DE" smtClean="0"/>
-              <a:t>09.03.2022</a:t>
+              <a:t>30.03.2022</a:t>
             </a:fld>
             <a:endParaRPr lang="de-DE"/>
           </a:p>
@@ -28978,7 +28978,7 @@
           <a:p>
             <a:fld id="{A3D84A41-9102-4FAF-BB9B-7AD126A78344}" type="datetime1">
               <a:rPr lang="de-DE" smtClean="0"/>
-              <a:t>09.03.2022</a:t>
+              <a:t>30.03.2022</a:t>
             </a:fld>
             <a:endParaRPr lang="de-DE"/>
           </a:p>
@@ -29588,7 +29588,7 @@
           <a:p>
             <a:fld id="{81CA66B2-419B-4A00-B550-DA1493185108}" type="datetime1">
               <a:rPr lang="de-DE" smtClean="0"/>
-              <a:t>09.03.2022</a:t>
+              <a:t>30.03.2022</a:t>
             </a:fld>
             <a:endParaRPr lang="de-DE"/>
           </a:p>
@@ -30417,7 +30417,7 @@
           <a:p>
             <a:fld id="{374AF400-B2B3-4498-869C-65158B84F62E}" type="datetime1">
               <a:rPr lang="de-DE" smtClean="0"/>
-              <a:t>09.03.2022</a:t>
+              <a:t>30.03.2022</a:t>
             </a:fld>
             <a:endParaRPr lang="de-DE"/>
           </a:p>
@@ -30627,7 +30627,7 @@
           <a:p>
             <a:fld id="{EECFBCB7-6E51-47D1-88C0-70C111ACD504}" type="datetime1">
               <a:rPr lang="de-DE" smtClean="0"/>
-              <a:t>09.03.2022</a:t>
+              <a:t>30.03.2022</a:t>
             </a:fld>
             <a:endParaRPr lang="de-DE"/>
           </a:p>
@@ -31065,7 +31065,7 @@
           <a:p>
             <a:fld id="{284F0D45-833B-4CA2-95DA-AFDB6EDAE49B}" type="datetime1">
               <a:rPr lang="de-DE" smtClean="0"/>
-              <a:t>09.03.2022</a:t>
+              <a:t>30.03.2022</a:t>
             </a:fld>
             <a:endParaRPr lang="de-DE"/>
           </a:p>
@@ -31365,7 +31365,7 @@
           <a:p>
             <a:fld id="{F8D4647A-5A37-41ED-945E-4016D17F713F}" type="datetime1">
               <a:rPr lang="de-DE" smtClean="0"/>
-              <a:t>09.03.2022</a:t>
+              <a:t>30.03.2022</a:t>
             </a:fld>
             <a:endParaRPr lang="de-DE"/>
           </a:p>
@@ -31607,7 +31607,7 @@
           <a:p>
             <a:fld id="{040A1E27-A9C0-4EC9-BE62-C00CB62B7D24}" type="datetime1">
               <a:rPr lang="de-DE" smtClean="0"/>
-              <a:t>09.03.2022</a:t>
+              <a:t>30.03.2022</a:t>
             </a:fld>
             <a:endParaRPr lang="de-DE"/>
           </a:p>
@@ -31818,7 +31818,7 @@
           <a:p>
             <a:fld id="{8159FE7A-07D2-4D3F-9855-29B7F3DF1D43}" type="datetime1">
               <a:rPr lang="de-DE" smtClean="0"/>
-              <a:t>09.03.2022</a:t>
+              <a:t>30.03.2022</a:t>
             </a:fld>
             <a:endParaRPr lang="de-DE"/>
           </a:p>
@@ -32480,6 +32480,87 @@
                                   </p:childTnLst>
                                 </p:cTn>
                               </p:par>
+                              <p:par>
+                                <p:cTn id="7" presetID="1" presetClass="entr" presetSubtype="0" fill="hold" grpId="0" nodeType="withEffect">
+                                  <p:stCondLst>
+                                    <p:cond delay="0"/>
+                                  </p:stCondLst>
+                                  <p:childTnLst>
+                                    <p:set>
+                                      <p:cBhvr>
+                                        <p:cTn id="8" dur="1" fill="hold">
+                                          <p:stCondLst>
+                                            <p:cond delay="0"/>
+                                          </p:stCondLst>
+                                        </p:cTn>
+                                        <p:tgtEl>
+                                          <p:spTgt spid="19"/>
+                                        </p:tgtEl>
+                                        <p:attrNameLst>
+                                          <p:attrName>style.visibility</p:attrName>
+                                        </p:attrNameLst>
+                                      </p:cBhvr>
+                                      <p:to>
+                                        <p:strVal val="visible"/>
+                                      </p:to>
+                                    </p:set>
+                                  </p:childTnLst>
+                                </p:cTn>
+                              </p:par>
+                              <p:par>
+                                <p:cTn id="9" presetID="1" presetClass="entr" presetSubtype="0" fill="hold" grpId="0" nodeType="withEffect">
+                                  <p:stCondLst>
+                                    <p:cond delay="0"/>
+                                  </p:stCondLst>
+                                  <p:childTnLst>
+                                    <p:set>
+                                      <p:cBhvr>
+                                        <p:cTn id="10" dur="1" fill="hold">
+                                          <p:stCondLst>
+                                            <p:cond delay="0"/>
+                                          </p:stCondLst>
+                                        </p:cTn>
+                                        <p:tgtEl>
+                                          <p:spTgt spid="20"/>
+                                        </p:tgtEl>
+                                        <p:attrNameLst>
+                                          <p:attrName>style.visibility</p:attrName>
+                                        </p:attrNameLst>
+                                      </p:cBhvr>
+                                      <p:to>
+                                        <p:strVal val="visible"/>
+                                      </p:to>
+                                    </p:set>
+                                  </p:childTnLst>
+                                </p:cTn>
+                              </p:par>
+                              <p:par>
+                                <p:cTn id="11" presetID="1" presetClass="entr" presetSubtype="0" fill="hold" grpId="0" nodeType="withEffect">
+                                  <p:stCondLst>
+                                    <p:cond delay="0"/>
+                                  </p:stCondLst>
+                                  <p:childTnLst>
+                                    <p:set>
+                                      <p:cBhvr>
+                                        <p:cTn id="12" dur="1" fill="hold">
+                                          <p:stCondLst>
+                                            <p:cond delay="0"/>
+                                          </p:stCondLst>
+                                        </p:cTn>
+                                        <p:tgtEl>
+                                          <p:spTgt spid="21"/>
+                                        </p:tgtEl>
+                                        <p:attrNameLst>
+                                          <p:attrName>style.visibility</p:attrName>
+                                        </p:attrNameLst>
+                                      </p:cBhvr>
+                                      <p:to>
+                                        <p:strVal val="visible"/>
+                                      </p:to>
+                                    </p:set>
+                                  </p:childTnLst>
+                                </p:cTn>
+                              </p:par>
                             </p:childTnLst>
                           </p:cTn>
                         </p:par>
@@ -32487,26 +32568,26 @@
                     </p:cTn>
                   </p:par>
                   <p:par>
-                    <p:cTn id="7" fill="hold">
+                    <p:cTn id="13" fill="hold">
                       <p:stCondLst>
                         <p:cond delay="indefinite"/>
                       </p:stCondLst>
                       <p:childTnLst>
                         <p:par>
-                          <p:cTn id="8" fill="hold">
+                          <p:cTn id="14" fill="hold">
                             <p:stCondLst>
                               <p:cond delay="0"/>
                             </p:stCondLst>
                             <p:childTnLst>
                               <p:par>
-                                <p:cTn id="9" presetID="1" presetClass="entr" presetSubtype="0" fill="hold" nodeType="clickEffect">
+                                <p:cTn id="15" presetID="1" presetClass="entr" presetSubtype="0" fill="hold" nodeType="clickEffect">
                                   <p:stCondLst>
                                     <p:cond delay="0"/>
                                   </p:stCondLst>
                                   <p:childTnLst>
                                     <p:set>
                                       <p:cBhvr>
-                                        <p:cTn id="10" dur="1" fill="hold">
+                                        <p:cTn id="16" dur="1" fill="hold">
                                           <p:stCondLst>
                                             <p:cond delay="0"/>
                                           </p:stCondLst>
@@ -32552,6 +32633,11 @@
         </p:cTn>
       </p:par>
     </p:tnLst>
+    <p:bldLst>
+      <p:bldP spid="19" grpId="0"/>
+      <p:bldP spid="20" grpId="0"/>
+      <p:bldP spid="21" grpId="0"/>
+    </p:bldLst>
   </p:timing>
 </p:sld>
 </file>
@@ -32698,7 +32784,7 @@
           <a:p>
             <a:fld id="{8159FE7A-07D2-4D3F-9855-29B7F3DF1D43}" type="datetime1">
               <a:rPr lang="de-DE" smtClean="0"/>
-              <a:t>09.03.2022</a:t>
+              <a:t>30.03.2022</a:t>
             </a:fld>
             <a:endParaRPr lang="de-DE"/>
           </a:p>
@@ -33477,7 +33563,7 @@
           <a:p>
             <a:fld id="{8159FE7A-07D2-4D3F-9855-29B7F3DF1D43}" type="datetime1">
               <a:rPr lang="de-DE" smtClean="0"/>
-              <a:t>09.03.2022</a:t>
+              <a:t>30.03.2022</a:t>
             </a:fld>
             <a:endParaRPr lang="de-DE"/>
           </a:p>
@@ -34227,7 +34313,7 @@
           <a:p>
             <a:fld id="{8159FE7A-07D2-4D3F-9855-29B7F3DF1D43}" type="datetime1">
               <a:rPr lang="de-DE" smtClean="0"/>
-              <a:t>09.03.2022</a:t>
+              <a:t>30.03.2022</a:t>
             </a:fld>
             <a:endParaRPr lang="de-DE"/>
           </a:p>
@@ -34488,7 +34574,7 @@
           <a:p>
             <a:fld id="{BC1A8AC8-5070-4C02-8E82-DE4FD3F8497A}" type="datetime1">
               <a:rPr lang="de-DE" smtClean="0"/>
-              <a:t>09.03.2022</a:t>
+              <a:t>30.03.2022</a:t>
             </a:fld>
             <a:endParaRPr lang="de-DE"/>
           </a:p>
@@ -34801,7 +34887,7 @@
           <a:p>
             <a:fld id="{AF1CB7BF-E60D-47C9-99CD-43B03711F834}" type="datetime1">
               <a:rPr lang="de-DE" smtClean="0"/>
-              <a:t>09.03.2022</a:t>
+              <a:t>30.03.2022</a:t>
             </a:fld>
             <a:endParaRPr lang="de-DE"/>
           </a:p>
@@ -35010,7 +35096,7 @@
           <a:p>
             <a:fld id="{B9053FEB-F038-4EB7-B9DC-77977117EA33}" type="datetime1">
               <a:rPr lang="de-DE" smtClean="0"/>
-              <a:t>09.03.2022</a:t>
+              <a:t>30.03.2022</a:t>
             </a:fld>
             <a:endParaRPr lang="de-DE"/>
           </a:p>
@@ -35570,7 +35656,7 @@
           <a:p>
             <a:fld id="{0B399FA5-2F01-416C-865E-705C1E0C03C8}" type="datetime1">
               <a:rPr lang="de-DE" smtClean="0"/>
-              <a:t>09.03.2022</a:t>
+              <a:t>30.03.2022</a:t>
             </a:fld>
             <a:endParaRPr lang="de-DE"/>
           </a:p>
@@ -35849,6 +35935,33 @@
                                   </p:childTnLst>
                                 </p:cTn>
                               </p:par>
+                              <p:par>
+                                <p:cTn id="9" presetID="1" presetClass="entr" presetSubtype="0" fill="hold" nodeType="withEffect">
+                                  <p:stCondLst>
+                                    <p:cond delay="0"/>
+                                  </p:stCondLst>
+                                  <p:childTnLst>
+                                    <p:set>
+                                      <p:cBhvr>
+                                        <p:cTn id="10" dur="1" fill="hold">
+                                          <p:stCondLst>
+                                            <p:cond delay="0"/>
+                                          </p:stCondLst>
+                                        </p:cTn>
+                                        <p:tgtEl>
+                                          <p:spTgt spid="12"/>
+                                        </p:tgtEl>
+                                        <p:attrNameLst>
+                                          <p:attrName>style.visibility</p:attrName>
+                                        </p:attrNameLst>
+                                      </p:cBhvr>
+                                      <p:to>
+                                        <p:strVal val="visible"/>
+                                      </p:to>
+                                    </p:set>
+                                  </p:childTnLst>
+                                </p:cTn>
+                              </p:par>
                             </p:childTnLst>
                           </p:cTn>
                         </p:par>
@@ -36026,7 +36139,7 @@
           <a:p>
             <a:fld id="{D7CFAA5B-8ED2-4D87-B5CD-876772B506EB}" type="datetime1">
               <a:rPr lang="de-DE" smtClean="0"/>
-              <a:t>09.03.2022</a:t>
+              <a:t>30.03.2022</a:t>
             </a:fld>
             <a:endParaRPr lang="de-DE"/>
           </a:p>
@@ -36500,7 +36613,7 @@
           <a:p>
             <a:fld id="{706CFF74-9D82-4823-AFE2-CBE8D2D808FC}" type="datetime1">
               <a:rPr lang="de-DE" smtClean="0"/>
-              <a:t>09.03.2022</a:t>
+              <a:t>30.03.2022</a:t>
             </a:fld>
             <a:endParaRPr lang="de-DE"/>
           </a:p>
@@ -36771,7 +36884,7 @@
           <a:p>
             <a:fld id="{5C03BAA7-20D5-4E1B-8CB5-A2ED8F9EFD7F}" type="datetime1">
               <a:rPr lang="de-DE" smtClean="0"/>
-              <a:t>09.03.2022</a:t>
+              <a:t>30.03.2022</a:t>
             </a:fld>
             <a:endParaRPr lang="de-DE"/>
           </a:p>
@@ -36970,7 +37083,7 @@
           <a:p>
             <a:fld id="{DF7C2B1F-6E2C-496E-BFF9-7CD4B274FE9C}" type="datetime1">
               <a:rPr lang="de-DE" smtClean="0"/>
-              <a:t>09.03.2022</a:t>
+              <a:t>30.03.2022</a:t>
             </a:fld>
             <a:endParaRPr lang="de-DE"/>
           </a:p>
@@ -37210,7 +37323,7 @@
           <a:p>
             <a:fld id="{8159FE7A-07D2-4D3F-9855-29B7F3DF1D43}" type="datetime1">
               <a:rPr lang="de-DE" smtClean="0"/>
-              <a:t>09.03.2022</a:t>
+              <a:t>30.03.2022</a:t>
             </a:fld>
             <a:endParaRPr lang="de-DE"/>
           </a:p>
@@ -37704,7 +37817,7 @@
           <a:p>
             <a:fld id="{8159FE7A-07D2-4D3F-9855-29B7F3DF1D43}" type="datetime1">
               <a:rPr lang="de-DE" smtClean="0"/>
-              <a:t>09.03.2022</a:t>
+              <a:t>30.03.2022</a:t>
             </a:fld>
             <a:endParaRPr lang="de-DE"/>
           </a:p>
@@ -38095,7 +38208,7 @@
           <a:p>
             <a:fld id="{8159FE7A-07D2-4D3F-9855-29B7F3DF1D43}" type="datetime1">
               <a:rPr lang="de-DE" smtClean="0"/>
-              <a:t>09.03.2022</a:t>
+              <a:t>30.03.2022</a:t>
             </a:fld>
             <a:endParaRPr lang="de-DE"/>
           </a:p>
@@ -38513,7 +38626,7 @@
           <a:p>
             <a:fld id="{8159FE7A-07D2-4D3F-9855-29B7F3DF1D43}" type="datetime1">
               <a:rPr lang="de-DE" smtClean="0"/>
-              <a:t>09.03.2022</a:t>
+              <a:t>30.03.2022</a:t>
             </a:fld>
             <a:endParaRPr lang="de-DE"/>
           </a:p>
@@ -39472,7 +39585,7 @@
           <a:p>
             <a:fld id="{8159FE7A-07D2-4D3F-9855-29B7F3DF1D43}" type="datetime1">
               <a:rPr lang="de-DE" smtClean="0"/>
-              <a:t>09.03.2022</a:t>
+              <a:t>30.03.2022</a:t>
             </a:fld>
             <a:endParaRPr lang="de-DE"/>
           </a:p>
@@ -39786,7 +39899,7 @@
           <a:p>
             <a:fld id="{8159FE7A-07D2-4D3F-9855-29B7F3DF1D43}" type="datetime1">
               <a:rPr lang="de-DE" smtClean="0"/>
-              <a:t>09.03.2022</a:t>
+              <a:t>30.03.2022</a:t>
             </a:fld>
             <a:endParaRPr lang="de-DE"/>
           </a:p>
@@ -40105,7 +40218,7 @@
           <a:p>
             <a:fld id="{B1DC90A9-3629-4532-90FF-C4E33F6085C7}" type="datetime1">
               <a:rPr lang="de-DE" smtClean="0"/>
-              <a:t>09.03.2022</a:t>
+              <a:t>30.03.2022</a:t>
             </a:fld>
             <a:endParaRPr lang="de-DE"/>
           </a:p>
@@ -40705,7 +40818,7 @@
           <a:p>
             <a:fld id="{23613DF9-A7E5-45FC-950B-BCC0B949EAE8}" type="datetime1">
               <a:rPr lang="de-DE" smtClean="0"/>
-              <a:t>09.03.2022</a:t>
+              <a:t>30.03.2022</a:t>
             </a:fld>
             <a:endParaRPr lang="de-DE"/>
           </a:p>
@@ -40888,7 +41001,7 @@
           <a:p>
             <a:fld id="{52EDD6C4-E3A8-4042-BB5D-CDA1A571A185}" type="datetime1">
               <a:rPr lang="de-DE" smtClean="0"/>
-              <a:t>09.03.2022</a:t>
+              <a:t>30.03.2022</a:t>
             </a:fld>
             <a:endParaRPr lang="de-DE"/>
           </a:p>
@@ -41429,7 +41542,7 @@
           <a:p>
             <a:fld id="{DDF7F67B-F411-40A4-BFC4-67CF6BB150A8}" type="datetime1">
               <a:rPr lang="de-DE" smtClean="0"/>
-              <a:t>09.03.2022</a:t>
+              <a:t>30.03.2022</a:t>
             </a:fld>
             <a:endParaRPr lang="de-DE"/>
           </a:p>
@@ -41773,7 +41886,7 @@
           <a:p>
             <a:fld id="{0A4B30BD-3EA6-4E11-8FCF-965C309E549A}" type="datetime1">
               <a:rPr lang="de-DE" smtClean="0"/>
-              <a:t>09.03.2022</a:t>
+              <a:t>30.03.2022</a:t>
             </a:fld>
             <a:endParaRPr lang="de-DE"/>
           </a:p>
@@ -41978,7 +42091,7 @@
           <a:p>
             <a:fld id="{DC040C72-25B9-466A-8F50-EBEC34934428}" type="datetime1">
               <a:rPr lang="de-DE" smtClean="0"/>
-              <a:t>09.03.2022</a:t>
+              <a:t>30.03.2022</a:t>
             </a:fld>
             <a:endParaRPr lang="de-DE"/>
           </a:p>
@@ -42459,7 +42572,7 @@
           <a:p>
             <a:fld id="{D285A436-1444-4657-AC1F-E488FE3B222B}" type="datetime1">
               <a:rPr lang="de-DE" smtClean="0"/>
-              <a:t>09.03.2022</a:t>
+              <a:t>30.03.2022</a:t>
             </a:fld>
             <a:endParaRPr lang="de-DE"/>
           </a:p>
@@ -42758,7 +42871,7 @@
           <a:p>
             <a:fld id="{93D272A3-5ACD-4745-88C6-1454260DA419}" type="datetime1">
               <a:rPr lang="de-DE" smtClean="0"/>
-              <a:t>09.03.2022</a:t>
+              <a:t>30.03.2022</a:t>
             </a:fld>
             <a:endParaRPr lang="de-DE"/>
           </a:p>
@@ -43907,7 +44020,7 @@
           <a:p>
             <a:fld id="{40518CB0-8C60-4E9D-9D73-72C22CA560A6}" type="datetime1">
               <a:rPr lang="de-DE" smtClean="0"/>
-              <a:t>09.03.2022</a:t>
+              <a:t>30.03.2022</a:t>
             </a:fld>
             <a:endParaRPr lang="de-DE"/>
           </a:p>
@@ -44230,7 +44343,7 @@
           <a:p>
             <a:fld id="{CC68D73E-E1AC-4A78-BFE5-D11401939CB4}" type="datetime1">
               <a:rPr lang="de-DE" smtClean="0"/>
-              <a:t>09.03.2022</a:t>
+              <a:t>30.03.2022</a:t>
             </a:fld>
             <a:endParaRPr lang="de-DE"/>
           </a:p>
@@ -45312,7 +45425,7 @@
           <a:p>
             <a:fld id="{6F2D9553-3793-4073-884D-343164046EA8}" type="datetime1">
               <a:rPr lang="de-DE" smtClean="0"/>
-              <a:t>09.03.2022</a:t>
+              <a:t>30.03.2022</a:t>
             </a:fld>
             <a:endParaRPr lang="de-DE"/>
           </a:p>
@@ -45787,7 +45900,7 @@
           <a:p>
             <a:fld id="{B5791953-A376-4A7E-8677-AAB812D71689}" type="datetime1">
               <a:rPr lang="de-DE" smtClean="0"/>
-              <a:t>09.03.2022</a:t>
+              <a:t>30.03.2022</a:t>
             </a:fld>
             <a:endParaRPr lang="de-DE"/>
           </a:p>
@@ -45994,7 +46107,7 @@
           <a:p>
             <a:fld id="{5B795128-38A1-4494-B687-FA4BAF969426}" type="datetime1">
               <a:rPr lang="de-DE" smtClean="0"/>
-              <a:t>09.03.2022</a:t>
+              <a:t>30.03.2022</a:t>
             </a:fld>
             <a:endParaRPr lang="de-DE"/>
           </a:p>
@@ -46188,7 +46301,7 @@
           <a:p>
             <a:fld id="{5F4637E3-489C-402C-9745-FC1C6A002798}" type="datetime1">
               <a:rPr lang="de-DE" smtClean="0"/>
-              <a:t>09.03.2022</a:t>
+              <a:t>30.03.2022</a:t>
             </a:fld>
             <a:endParaRPr lang="de-DE"/>
           </a:p>
@@ -46427,7 +46540,7 @@
           <a:p>
             <a:fld id="{96C0D114-F0DB-443F-9337-40D84E177FDC}" type="datetime1">
               <a:rPr lang="de-DE" smtClean="0"/>
-              <a:t>09.03.2022</a:t>
+              <a:t>30.03.2022</a:t>
             </a:fld>
             <a:endParaRPr lang="de-DE"/>
           </a:p>
@@ -46625,7 +46738,7 @@
           <a:p>
             <a:fld id="{DC9D7DCD-D634-4B62-9FA2-4E9A76968B39}" type="datetime1">
               <a:rPr lang="de-DE" smtClean="0"/>
-              <a:t>09.03.2022</a:t>
+              <a:t>30.03.2022</a:t>
             </a:fld>
             <a:endParaRPr lang="de-DE"/>
           </a:p>
@@ -47130,7 +47243,7 @@
           <a:p>
             <a:fld id="{3665ADD3-A45B-4AFB-ADB5-8849ACC19EEF}" type="datetime1">
               <a:rPr lang="de-DE" smtClean="0"/>
-              <a:t>09.03.2022</a:t>
+              <a:t>30.03.2022</a:t>
             </a:fld>
             <a:endParaRPr lang="de-DE"/>
           </a:p>
@@ -47478,7 +47591,7 @@
           <a:p>
             <a:fld id="{DD8B8171-21DA-4907-A9C5-6774B32408EF}" type="datetime1">
               <a:rPr lang="de-DE" smtClean="0"/>
-              <a:t>09.03.2022</a:t>
+              <a:t>30.03.2022</a:t>
             </a:fld>
             <a:endParaRPr lang="de-DE"/>
           </a:p>
@@ -47971,7 +48084,7 @@
           <a:p>
             <a:fld id="{1B9B7D4F-084D-4938-987D-2F1AC790542C}" type="datetime1">
               <a:rPr lang="de-DE" smtClean="0"/>
-              <a:t>09.03.2022</a:t>
+              <a:t>30.03.2022</a:t>
             </a:fld>
             <a:endParaRPr lang="de-DE"/>
           </a:p>
@@ -48352,7 +48465,7 @@
           <a:p>
             <a:fld id="{9B861850-1CC1-4EA2-B13E-5F4984DD6765}" type="datetime1">
               <a:rPr lang="de-DE" smtClean="0"/>
-              <a:t>09.03.2022</a:t>
+              <a:t>30.03.2022</a:t>
             </a:fld>
             <a:endParaRPr lang="de-DE"/>
           </a:p>
@@ -48578,7 +48691,7 @@
           <a:p>
             <a:fld id="{889CA5D6-219F-4100-8B22-6093808BA88C}" type="datetime1">
               <a:rPr lang="de-DE" smtClean="0"/>
-              <a:t>09.03.2022</a:t>
+              <a:t>30.03.2022</a:t>
             </a:fld>
             <a:endParaRPr lang="de-DE"/>
           </a:p>
@@ -48774,7 +48887,7 @@
           <a:p>
             <a:fld id="{E3EA1E44-3556-4DD6-B627-361E1D69BC25}" type="datetime1">
               <a:rPr lang="de-DE" smtClean="0"/>
-              <a:t>09.03.2022</a:t>
+              <a:t>30.03.2022</a:t>
             </a:fld>
             <a:endParaRPr lang="de-DE"/>
           </a:p>
@@ -48932,7 +49045,7 @@
           <a:p>
             <a:fld id="{1540C555-F8A4-4422-9B93-FA0C3929592C}" type="datetime1">
               <a:rPr lang="de-DE" smtClean="0"/>
-              <a:t>09.03.2022</a:t>
+              <a:t>30.03.2022</a:t>
             </a:fld>
             <a:endParaRPr lang="de-DE"/>
           </a:p>
@@ -49768,7 +49881,7 @@
           <a:p>
             <a:fld id="{5B67CC1C-91AE-4741-BE88-3E8933D29597}" type="datetime1">
               <a:rPr lang="de-DE" smtClean="0"/>
-              <a:t>09.03.2022</a:t>
+              <a:t>30.03.2022</a:t>
             </a:fld>
             <a:endParaRPr lang="de-DE"/>
           </a:p>
@@ -50401,7 +50514,7 @@
           <a:p>
             <a:fld id="{3466B08E-FC5F-4F44-9AE8-540AFED46B32}" type="datetime1">
               <a:rPr lang="de-DE" smtClean="0"/>
-              <a:t>09.03.2022</a:t>
+              <a:t>30.03.2022</a:t>
             </a:fld>
             <a:endParaRPr lang="de-DE"/>
           </a:p>

</xml_diff>

<commit_message>
Korrektur Typo auf Folie 97
</commit_message>
<xml_diff>
--- a/Dart.pptx
+++ b/Dart.pptx
@@ -48987,8 +48987,13 @@
           <a:p>
             <a:r>
               <a:rPr lang="de-DE" dirty="0"/>
-              <a:t>Klassen und Objekte in Python</a:t>
-            </a:r>
+              <a:t>Klassen und Objekte </a:t>
+            </a:r>
+            <a:r>
+              <a:rPr lang="de-DE"/>
+              <a:t>in Dart</a:t>
+            </a:r>
+            <a:endParaRPr lang="de-DE" dirty="0"/>
           </a:p>
         </p:txBody>
       </p:sp>

</xml_diff>